<commit_message>
Yet more debugging. Also added release version taggging to downloaded files.
Added the UniProt or Ensembl release/version tags to downloaded FASTA files.
Changed camel case variable names to PEP 8 format.
</commit_message>
<xml_diff>
--- a/User_Guide_UniProt.pptx
+++ b/User_Guide_UniProt.pptx
@@ -150,7 +150,7 @@
           <p:cNvPr id="2" name="Title 1">
             <a:extLst>
               <a:ext uri="{FF2B5EF4-FFF2-40B4-BE49-F238E27FC236}">
-                <a16:creationId xmlns="" xmlns:a16="http://schemas.microsoft.com/office/drawing/2014/main" id="{1CEC9522-93E9-44EF-812C-19BBE36871AB}"/>
+                <a16:creationId xmlns:a16="http://schemas.microsoft.com/office/drawing/2014/main" xmlns="" id="{1CEC9522-93E9-44EF-812C-19BBE36871AB}"/>
               </a:ext>
             </a:extLst>
           </p:cNvPr>
@@ -187,7 +187,7 @@
           <p:cNvPr id="3" name="Subtitle 2">
             <a:extLst>
               <a:ext uri="{FF2B5EF4-FFF2-40B4-BE49-F238E27FC236}">
-                <a16:creationId xmlns="" xmlns:a16="http://schemas.microsoft.com/office/drawing/2014/main" id="{B1019D7F-359A-46C8-AA57-22165142DC8D}"/>
+                <a16:creationId xmlns:a16="http://schemas.microsoft.com/office/drawing/2014/main" xmlns="" id="{B1019D7F-359A-46C8-AA57-22165142DC8D}"/>
               </a:ext>
             </a:extLst>
           </p:cNvPr>
@@ -257,7 +257,7 @@
           <p:cNvPr id="4" name="Date Placeholder 3">
             <a:extLst>
               <a:ext uri="{FF2B5EF4-FFF2-40B4-BE49-F238E27FC236}">
-                <a16:creationId xmlns="" xmlns:a16="http://schemas.microsoft.com/office/drawing/2014/main" id="{ED2F6D59-659B-40D8-9B5D-F5EA69350F2E}"/>
+                <a16:creationId xmlns:a16="http://schemas.microsoft.com/office/drawing/2014/main" xmlns="" id="{ED2F6D59-659B-40D8-9B5D-F5EA69350F2E}"/>
               </a:ext>
             </a:extLst>
           </p:cNvPr>
@@ -275,7 +275,7 @@
           <a:p>
             <a:fld id="{451BDFE6-D27D-4DA7-953E-74377D1BCDB7}" type="datetimeFigureOut">
               <a:rPr lang="en-US" smtClean="0"/>
-              <a:t>8/4/17</a:t>
+              <a:t>8/13/17</a:t>
             </a:fld>
             <a:endParaRPr lang="en-US"/>
           </a:p>
@@ -286,7 +286,7 @@
           <p:cNvPr id="5" name="Footer Placeholder 4">
             <a:extLst>
               <a:ext uri="{FF2B5EF4-FFF2-40B4-BE49-F238E27FC236}">
-                <a16:creationId xmlns="" xmlns:a16="http://schemas.microsoft.com/office/drawing/2014/main" id="{AAAB214F-8D5F-4F99-BDA0-03F3BE3612E9}"/>
+                <a16:creationId xmlns:a16="http://schemas.microsoft.com/office/drawing/2014/main" xmlns="" id="{AAAB214F-8D5F-4F99-BDA0-03F3BE3612E9}"/>
               </a:ext>
             </a:extLst>
           </p:cNvPr>
@@ -311,7 +311,7 @@
           <p:cNvPr id="6" name="Slide Number Placeholder 5">
             <a:extLst>
               <a:ext uri="{FF2B5EF4-FFF2-40B4-BE49-F238E27FC236}">
-                <a16:creationId xmlns="" xmlns:a16="http://schemas.microsoft.com/office/drawing/2014/main" id="{C18AB0CB-92D4-4AC1-8248-D82CA20B25B3}"/>
+                <a16:creationId xmlns:a16="http://schemas.microsoft.com/office/drawing/2014/main" xmlns="" id="{C18AB0CB-92D4-4AC1-8248-D82CA20B25B3}"/>
               </a:ext>
             </a:extLst>
           </p:cNvPr>
@@ -370,7 +370,7 @@
           <p:cNvPr id="2" name="Title 1">
             <a:extLst>
               <a:ext uri="{FF2B5EF4-FFF2-40B4-BE49-F238E27FC236}">
-                <a16:creationId xmlns="" xmlns:a16="http://schemas.microsoft.com/office/drawing/2014/main" id="{99695FEF-F41E-4535-8546-1EFDA5EDD6DE}"/>
+                <a16:creationId xmlns:a16="http://schemas.microsoft.com/office/drawing/2014/main" xmlns="" id="{99695FEF-F41E-4535-8546-1EFDA5EDD6DE}"/>
               </a:ext>
             </a:extLst>
           </p:cNvPr>
@@ -398,7 +398,7 @@
           <p:cNvPr id="3" name="Vertical Text Placeholder 2">
             <a:extLst>
               <a:ext uri="{FF2B5EF4-FFF2-40B4-BE49-F238E27FC236}">
-                <a16:creationId xmlns="" xmlns:a16="http://schemas.microsoft.com/office/drawing/2014/main" id="{70606A92-B9AD-4004-BFBE-B21891BE4323}"/>
+                <a16:creationId xmlns:a16="http://schemas.microsoft.com/office/drawing/2014/main" xmlns="" id="{70606A92-B9AD-4004-BFBE-B21891BE4323}"/>
               </a:ext>
             </a:extLst>
           </p:cNvPr>
@@ -455,7 +455,7 @@
           <p:cNvPr id="4" name="Date Placeholder 3">
             <a:extLst>
               <a:ext uri="{FF2B5EF4-FFF2-40B4-BE49-F238E27FC236}">
-                <a16:creationId xmlns="" xmlns:a16="http://schemas.microsoft.com/office/drawing/2014/main" id="{C15B744A-4AD6-4603-8D91-95814ADD1C8A}"/>
+                <a16:creationId xmlns:a16="http://schemas.microsoft.com/office/drawing/2014/main" xmlns="" id="{C15B744A-4AD6-4603-8D91-95814ADD1C8A}"/>
               </a:ext>
             </a:extLst>
           </p:cNvPr>
@@ -473,7 +473,7 @@
           <a:p>
             <a:fld id="{451BDFE6-D27D-4DA7-953E-74377D1BCDB7}" type="datetimeFigureOut">
               <a:rPr lang="en-US" smtClean="0"/>
-              <a:t>8/4/17</a:t>
+              <a:t>8/13/17</a:t>
             </a:fld>
             <a:endParaRPr lang="en-US"/>
           </a:p>
@@ -484,7 +484,7 @@
           <p:cNvPr id="5" name="Footer Placeholder 4">
             <a:extLst>
               <a:ext uri="{FF2B5EF4-FFF2-40B4-BE49-F238E27FC236}">
-                <a16:creationId xmlns="" xmlns:a16="http://schemas.microsoft.com/office/drawing/2014/main" id="{A8369442-DDC6-47BB-A8A6-F3A8C8F9BFC2}"/>
+                <a16:creationId xmlns:a16="http://schemas.microsoft.com/office/drawing/2014/main" xmlns="" id="{A8369442-DDC6-47BB-A8A6-F3A8C8F9BFC2}"/>
               </a:ext>
             </a:extLst>
           </p:cNvPr>
@@ -509,7 +509,7 @@
           <p:cNvPr id="6" name="Slide Number Placeholder 5">
             <a:extLst>
               <a:ext uri="{FF2B5EF4-FFF2-40B4-BE49-F238E27FC236}">
-                <a16:creationId xmlns="" xmlns:a16="http://schemas.microsoft.com/office/drawing/2014/main" id="{43DD66A6-AEE4-48D1-92D8-C28956EE6A69}"/>
+                <a16:creationId xmlns:a16="http://schemas.microsoft.com/office/drawing/2014/main" xmlns="" id="{43DD66A6-AEE4-48D1-92D8-C28956EE6A69}"/>
               </a:ext>
             </a:extLst>
           </p:cNvPr>
@@ -568,7 +568,7 @@
           <p:cNvPr id="2" name="Vertical Title 1">
             <a:extLst>
               <a:ext uri="{FF2B5EF4-FFF2-40B4-BE49-F238E27FC236}">
-                <a16:creationId xmlns="" xmlns:a16="http://schemas.microsoft.com/office/drawing/2014/main" id="{2AC2B49F-2767-487A-8057-45DDB33A32B8}"/>
+                <a16:creationId xmlns:a16="http://schemas.microsoft.com/office/drawing/2014/main" xmlns="" id="{2AC2B49F-2767-487A-8057-45DDB33A32B8}"/>
               </a:ext>
             </a:extLst>
           </p:cNvPr>
@@ -601,7 +601,7 @@
           <p:cNvPr id="3" name="Vertical Text Placeholder 2">
             <a:extLst>
               <a:ext uri="{FF2B5EF4-FFF2-40B4-BE49-F238E27FC236}">
-                <a16:creationId xmlns="" xmlns:a16="http://schemas.microsoft.com/office/drawing/2014/main" id="{322FEB0F-C822-4E90-B43B-739BA145CB5E}"/>
+                <a16:creationId xmlns:a16="http://schemas.microsoft.com/office/drawing/2014/main" xmlns="" id="{322FEB0F-C822-4E90-B43B-739BA145CB5E}"/>
               </a:ext>
             </a:extLst>
           </p:cNvPr>
@@ -663,7 +663,7 @@
           <p:cNvPr id="4" name="Date Placeholder 3">
             <a:extLst>
               <a:ext uri="{FF2B5EF4-FFF2-40B4-BE49-F238E27FC236}">
-                <a16:creationId xmlns="" xmlns:a16="http://schemas.microsoft.com/office/drawing/2014/main" id="{F875980F-FE1D-4FD7-BFA9-AC910F6E9AB4}"/>
+                <a16:creationId xmlns:a16="http://schemas.microsoft.com/office/drawing/2014/main" xmlns="" id="{F875980F-FE1D-4FD7-BFA9-AC910F6E9AB4}"/>
               </a:ext>
             </a:extLst>
           </p:cNvPr>
@@ -681,7 +681,7 @@
           <a:p>
             <a:fld id="{451BDFE6-D27D-4DA7-953E-74377D1BCDB7}" type="datetimeFigureOut">
               <a:rPr lang="en-US" smtClean="0"/>
-              <a:t>8/4/17</a:t>
+              <a:t>8/13/17</a:t>
             </a:fld>
             <a:endParaRPr lang="en-US"/>
           </a:p>
@@ -692,7 +692,7 @@
           <p:cNvPr id="5" name="Footer Placeholder 4">
             <a:extLst>
               <a:ext uri="{FF2B5EF4-FFF2-40B4-BE49-F238E27FC236}">
-                <a16:creationId xmlns="" xmlns:a16="http://schemas.microsoft.com/office/drawing/2014/main" id="{861D4100-774F-40D2-A03D-5F8C7952FD47}"/>
+                <a16:creationId xmlns:a16="http://schemas.microsoft.com/office/drawing/2014/main" xmlns="" id="{861D4100-774F-40D2-A03D-5F8C7952FD47}"/>
               </a:ext>
             </a:extLst>
           </p:cNvPr>
@@ -717,7 +717,7 @@
           <p:cNvPr id="6" name="Slide Number Placeholder 5">
             <a:extLst>
               <a:ext uri="{FF2B5EF4-FFF2-40B4-BE49-F238E27FC236}">
-                <a16:creationId xmlns="" xmlns:a16="http://schemas.microsoft.com/office/drawing/2014/main" id="{D6219F0B-C0E7-4C63-BD7E-B5808CFAD062}"/>
+                <a16:creationId xmlns:a16="http://schemas.microsoft.com/office/drawing/2014/main" xmlns="" id="{D6219F0B-C0E7-4C63-BD7E-B5808CFAD062}"/>
               </a:ext>
             </a:extLst>
           </p:cNvPr>
@@ -776,7 +776,7 @@
           <p:cNvPr id="2" name="Title 1">
             <a:extLst>
               <a:ext uri="{FF2B5EF4-FFF2-40B4-BE49-F238E27FC236}">
-                <a16:creationId xmlns="" xmlns:a16="http://schemas.microsoft.com/office/drawing/2014/main" id="{E1710EEA-FBE7-42D5-8A9D-2D337EA09C52}"/>
+                <a16:creationId xmlns:a16="http://schemas.microsoft.com/office/drawing/2014/main" xmlns="" id="{E1710EEA-FBE7-42D5-8A9D-2D337EA09C52}"/>
               </a:ext>
             </a:extLst>
           </p:cNvPr>
@@ -804,7 +804,7 @@
           <p:cNvPr id="3" name="Content Placeholder 2">
             <a:extLst>
               <a:ext uri="{FF2B5EF4-FFF2-40B4-BE49-F238E27FC236}">
-                <a16:creationId xmlns="" xmlns:a16="http://schemas.microsoft.com/office/drawing/2014/main" id="{133641DF-E82A-45B8-9D52-B194C8074720}"/>
+                <a16:creationId xmlns:a16="http://schemas.microsoft.com/office/drawing/2014/main" xmlns="" id="{133641DF-E82A-45B8-9D52-B194C8074720}"/>
               </a:ext>
             </a:extLst>
           </p:cNvPr>
@@ -861,7 +861,7 @@
           <p:cNvPr id="4" name="Date Placeholder 3">
             <a:extLst>
               <a:ext uri="{FF2B5EF4-FFF2-40B4-BE49-F238E27FC236}">
-                <a16:creationId xmlns="" xmlns:a16="http://schemas.microsoft.com/office/drawing/2014/main" id="{2F50B840-B826-4A5A-A600-3F68F1C3CCC5}"/>
+                <a16:creationId xmlns:a16="http://schemas.microsoft.com/office/drawing/2014/main" xmlns="" id="{2F50B840-B826-4A5A-A600-3F68F1C3CCC5}"/>
               </a:ext>
             </a:extLst>
           </p:cNvPr>
@@ -879,7 +879,7 @@
           <a:p>
             <a:fld id="{451BDFE6-D27D-4DA7-953E-74377D1BCDB7}" type="datetimeFigureOut">
               <a:rPr lang="en-US" smtClean="0"/>
-              <a:t>8/4/17</a:t>
+              <a:t>8/13/17</a:t>
             </a:fld>
             <a:endParaRPr lang="en-US"/>
           </a:p>
@@ -890,7 +890,7 @@
           <p:cNvPr id="5" name="Footer Placeholder 4">
             <a:extLst>
               <a:ext uri="{FF2B5EF4-FFF2-40B4-BE49-F238E27FC236}">
-                <a16:creationId xmlns="" xmlns:a16="http://schemas.microsoft.com/office/drawing/2014/main" id="{C2A15F6D-F3C8-4075-BEA6-BB0D5E7516B4}"/>
+                <a16:creationId xmlns:a16="http://schemas.microsoft.com/office/drawing/2014/main" xmlns="" id="{C2A15F6D-F3C8-4075-BEA6-BB0D5E7516B4}"/>
               </a:ext>
             </a:extLst>
           </p:cNvPr>
@@ -915,7 +915,7 @@
           <p:cNvPr id="6" name="Slide Number Placeholder 5">
             <a:extLst>
               <a:ext uri="{FF2B5EF4-FFF2-40B4-BE49-F238E27FC236}">
-                <a16:creationId xmlns="" xmlns:a16="http://schemas.microsoft.com/office/drawing/2014/main" id="{1345D41C-A83F-4006-9364-239DFC09EF0F}"/>
+                <a16:creationId xmlns:a16="http://schemas.microsoft.com/office/drawing/2014/main" xmlns="" id="{1345D41C-A83F-4006-9364-239DFC09EF0F}"/>
               </a:ext>
             </a:extLst>
           </p:cNvPr>
@@ -974,7 +974,7 @@
           <p:cNvPr id="2" name="Title 1">
             <a:extLst>
               <a:ext uri="{FF2B5EF4-FFF2-40B4-BE49-F238E27FC236}">
-                <a16:creationId xmlns="" xmlns:a16="http://schemas.microsoft.com/office/drawing/2014/main" id="{85C41ECE-2DDF-4E64-9356-6A089082ACD0}"/>
+                <a16:creationId xmlns:a16="http://schemas.microsoft.com/office/drawing/2014/main" xmlns="" id="{85C41ECE-2DDF-4E64-9356-6A089082ACD0}"/>
               </a:ext>
             </a:extLst>
           </p:cNvPr>
@@ -1011,7 +1011,7 @@
           <p:cNvPr id="3" name="Text Placeholder 2">
             <a:extLst>
               <a:ext uri="{FF2B5EF4-FFF2-40B4-BE49-F238E27FC236}">
-                <a16:creationId xmlns="" xmlns:a16="http://schemas.microsoft.com/office/drawing/2014/main" id="{99BB1483-3FE2-4F8E-B793-89FBDECD3910}"/>
+                <a16:creationId xmlns:a16="http://schemas.microsoft.com/office/drawing/2014/main" xmlns="" id="{99BB1483-3FE2-4F8E-B793-89FBDECD3910}"/>
               </a:ext>
             </a:extLst>
           </p:cNvPr>
@@ -1136,7 +1136,7 @@
           <p:cNvPr id="4" name="Date Placeholder 3">
             <a:extLst>
               <a:ext uri="{FF2B5EF4-FFF2-40B4-BE49-F238E27FC236}">
-                <a16:creationId xmlns="" xmlns:a16="http://schemas.microsoft.com/office/drawing/2014/main" id="{B2803368-05EC-4347-91AB-E1848E86CDDA}"/>
+                <a16:creationId xmlns:a16="http://schemas.microsoft.com/office/drawing/2014/main" xmlns="" id="{B2803368-05EC-4347-91AB-E1848E86CDDA}"/>
               </a:ext>
             </a:extLst>
           </p:cNvPr>
@@ -1154,7 +1154,7 @@
           <a:p>
             <a:fld id="{451BDFE6-D27D-4DA7-953E-74377D1BCDB7}" type="datetimeFigureOut">
               <a:rPr lang="en-US" smtClean="0"/>
-              <a:t>8/4/17</a:t>
+              <a:t>8/13/17</a:t>
             </a:fld>
             <a:endParaRPr lang="en-US"/>
           </a:p>
@@ -1165,7 +1165,7 @@
           <p:cNvPr id="5" name="Footer Placeholder 4">
             <a:extLst>
               <a:ext uri="{FF2B5EF4-FFF2-40B4-BE49-F238E27FC236}">
-                <a16:creationId xmlns="" xmlns:a16="http://schemas.microsoft.com/office/drawing/2014/main" id="{0A8D4987-E617-4881-8391-D9226A3040C6}"/>
+                <a16:creationId xmlns:a16="http://schemas.microsoft.com/office/drawing/2014/main" xmlns="" id="{0A8D4987-E617-4881-8391-D9226A3040C6}"/>
               </a:ext>
             </a:extLst>
           </p:cNvPr>
@@ -1190,7 +1190,7 @@
           <p:cNvPr id="6" name="Slide Number Placeholder 5">
             <a:extLst>
               <a:ext uri="{FF2B5EF4-FFF2-40B4-BE49-F238E27FC236}">
-                <a16:creationId xmlns="" xmlns:a16="http://schemas.microsoft.com/office/drawing/2014/main" id="{96B6BB51-0A87-45A5-862A-0F78722361A1}"/>
+                <a16:creationId xmlns:a16="http://schemas.microsoft.com/office/drawing/2014/main" xmlns="" id="{96B6BB51-0A87-45A5-862A-0F78722361A1}"/>
               </a:ext>
             </a:extLst>
           </p:cNvPr>
@@ -1249,7 +1249,7 @@
           <p:cNvPr id="2" name="Title 1">
             <a:extLst>
               <a:ext uri="{FF2B5EF4-FFF2-40B4-BE49-F238E27FC236}">
-                <a16:creationId xmlns="" xmlns:a16="http://schemas.microsoft.com/office/drawing/2014/main" id="{F440525D-EBDD-464C-AE08-797DE00DAAA0}"/>
+                <a16:creationId xmlns:a16="http://schemas.microsoft.com/office/drawing/2014/main" xmlns="" id="{F440525D-EBDD-464C-AE08-797DE00DAAA0}"/>
               </a:ext>
             </a:extLst>
           </p:cNvPr>
@@ -1277,7 +1277,7 @@
           <p:cNvPr id="3" name="Content Placeholder 2">
             <a:extLst>
               <a:ext uri="{FF2B5EF4-FFF2-40B4-BE49-F238E27FC236}">
-                <a16:creationId xmlns="" xmlns:a16="http://schemas.microsoft.com/office/drawing/2014/main" id="{BC586405-A41B-4F12-B054-B9E618F25ED6}"/>
+                <a16:creationId xmlns:a16="http://schemas.microsoft.com/office/drawing/2014/main" xmlns="" id="{BC586405-A41B-4F12-B054-B9E618F25ED6}"/>
               </a:ext>
             </a:extLst>
           </p:cNvPr>
@@ -1339,7 +1339,7 @@
           <p:cNvPr id="4" name="Content Placeholder 3">
             <a:extLst>
               <a:ext uri="{FF2B5EF4-FFF2-40B4-BE49-F238E27FC236}">
-                <a16:creationId xmlns="" xmlns:a16="http://schemas.microsoft.com/office/drawing/2014/main" id="{AE69ED25-6001-4519-99AE-B19883DE36E8}"/>
+                <a16:creationId xmlns:a16="http://schemas.microsoft.com/office/drawing/2014/main" xmlns="" id="{AE69ED25-6001-4519-99AE-B19883DE36E8}"/>
               </a:ext>
             </a:extLst>
           </p:cNvPr>
@@ -1401,7 +1401,7 @@
           <p:cNvPr id="5" name="Date Placeholder 4">
             <a:extLst>
               <a:ext uri="{FF2B5EF4-FFF2-40B4-BE49-F238E27FC236}">
-                <a16:creationId xmlns="" xmlns:a16="http://schemas.microsoft.com/office/drawing/2014/main" id="{A398D7DF-D37F-4943-A3DC-C39014B86553}"/>
+                <a16:creationId xmlns:a16="http://schemas.microsoft.com/office/drawing/2014/main" xmlns="" id="{A398D7DF-D37F-4943-A3DC-C39014B86553}"/>
               </a:ext>
             </a:extLst>
           </p:cNvPr>
@@ -1419,7 +1419,7 @@
           <a:p>
             <a:fld id="{451BDFE6-D27D-4DA7-953E-74377D1BCDB7}" type="datetimeFigureOut">
               <a:rPr lang="en-US" smtClean="0"/>
-              <a:t>8/4/17</a:t>
+              <a:t>8/13/17</a:t>
             </a:fld>
             <a:endParaRPr lang="en-US"/>
           </a:p>
@@ -1430,7 +1430,7 @@
           <p:cNvPr id="6" name="Footer Placeholder 5">
             <a:extLst>
               <a:ext uri="{FF2B5EF4-FFF2-40B4-BE49-F238E27FC236}">
-                <a16:creationId xmlns="" xmlns:a16="http://schemas.microsoft.com/office/drawing/2014/main" id="{F3CB2BC9-A6BA-45E0-B9C5-0B6FC47560DC}"/>
+                <a16:creationId xmlns:a16="http://schemas.microsoft.com/office/drawing/2014/main" xmlns="" id="{F3CB2BC9-A6BA-45E0-B9C5-0B6FC47560DC}"/>
               </a:ext>
             </a:extLst>
           </p:cNvPr>
@@ -1455,7 +1455,7 @@
           <p:cNvPr id="7" name="Slide Number Placeholder 6">
             <a:extLst>
               <a:ext uri="{FF2B5EF4-FFF2-40B4-BE49-F238E27FC236}">
-                <a16:creationId xmlns="" xmlns:a16="http://schemas.microsoft.com/office/drawing/2014/main" id="{D98CC828-E334-4D72-BE5E-3C6620A6F804}"/>
+                <a16:creationId xmlns:a16="http://schemas.microsoft.com/office/drawing/2014/main" xmlns="" id="{D98CC828-E334-4D72-BE5E-3C6620A6F804}"/>
               </a:ext>
             </a:extLst>
           </p:cNvPr>
@@ -1514,7 +1514,7 @@
           <p:cNvPr id="2" name="Title 1">
             <a:extLst>
               <a:ext uri="{FF2B5EF4-FFF2-40B4-BE49-F238E27FC236}">
-                <a16:creationId xmlns="" xmlns:a16="http://schemas.microsoft.com/office/drawing/2014/main" id="{1A2BC910-7622-4C43-B7D8-7F31E9512B8E}"/>
+                <a16:creationId xmlns:a16="http://schemas.microsoft.com/office/drawing/2014/main" xmlns="" id="{1A2BC910-7622-4C43-B7D8-7F31E9512B8E}"/>
               </a:ext>
             </a:extLst>
           </p:cNvPr>
@@ -1547,7 +1547,7 @@
           <p:cNvPr id="3" name="Text Placeholder 2">
             <a:extLst>
               <a:ext uri="{FF2B5EF4-FFF2-40B4-BE49-F238E27FC236}">
-                <a16:creationId xmlns="" xmlns:a16="http://schemas.microsoft.com/office/drawing/2014/main" id="{85551A84-BFDE-4863-899B-AC470B7E100F}"/>
+                <a16:creationId xmlns:a16="http://schemas.microsoft.com/office/drawing/2014/main" xmlns="" id="{85551A84-BFDE-4863-899B-AC470B7E100F}"/>
               </a:ext>
             </a:extLst>
           </p:cNvPr>
@@ -1618,7 +1618,7 @@
           <p:cNvPr id="4" name="Content Placeholder 3">
             <a:extLst>
               <a:ext uri="{FF2B5EF4-FFF2-40B4-BE49-F238E27FC236}">
-                <a16:creationId xmlns="" xmlns:a16="http://schemas.microsoft.com/office/drawing/2014/main" id="{B7E0CD55-F1F5-4DD2-BE6D-857F1B3AD118}"/>
+                <a16:creationId xmlns:a16="http://schemas.microsoft.com/office/drawing/2014/main" xmlns="" id="{B7E0CD55-F1F5-4DD2-BE6D-857F1B3AD118}"/>
               </a:ext>
             </a:extLst>
           </p:cNvPr>
@@ -1680,7 +1680,7 @@
           <p:cNvPr id="5" name="Text Placeholder 4">
             <a:extLst>
               <a:ext uri="{FF2B5EF4-FFF2-40B4-BE49-F238E27FC236}">
-                <a16:creationId xmlns="" xmlns:a16="http://schemas.microsoft.com/office/drawing/2014/main" id="{A3522D88-33B2-4601-B02A-3DEBD7321508}"/>
+                <a16:creationId xmlns:a16="http://schemas.microsoft.com/office/drawing/2014/main" xmlns="" id="{A3522D88-33B2-4601-B02A-3DEBD7321508}"/>
               </a:ext>
             </a:extLst>
           </p:cNvPr>
@@ -1751,7 +1751,7 @@
           <p:cNvPr id="6" name="Content Placeholder 5">
             <a:extLst>
               <a:ext uri="{FF2B5EF4-FFF2-40B4-BE49-F238E27FC236}">
-                <a16:creationId xmlns="" xmlns:a16="http://schemas.microsoft.com/office/drawing/2014/main" id="{176A6E08-7D30-46B1-8CC8-DAC6E058AB42}"/>
+                <a16:creationId xmlns:a16="http://schemas.microsoft.com/office/drawing/2014/main" xmlns="" id="{176A6E08-7D30-46B1-8CC8-DAC6E058AB42}"/>
               </a:ext>
             </a:extLst>
           </p:cNvPr>
@@ -1813,7 +1813,7 @@
           <p:cNvPr id="7" name="Date Placeholder 6">
             <a:extLst>
               <a:ext uri="{FF2B5EF4-FFF2-40B4-BE49-F238E27FC236}">
-                <a16:creationId xmlns="" xmlns:a16="http://schemas.microsoft.com/office/drawing/2014/main" id="{12C07FFB-384F-4120-9F74-2493FFF5045B}"/>
+                <a16:creationId xmlns:a16="http://schemas.microsoft.com/office/drawing/2014/main" xmlns="" id="{12C07FFB-384F-4120-9F74-2493FFF5045B}"/>
               </a:ext>
             </a:extLst>
           </p:cNvPr>
@@ -1831,7 +1831,7 @@
           <a:p>
             <a:fld id="{451BDFE6-D27D-4DA7-953E-74377D1BCDB7}" type="datetimeFigureOut">
               <a:rPr lang="en-US" smtClean="0"/>
-              <a:t>8/4/17</a:t>
+              <a:t>8/13/17</a:t>
             </a:fld>
             <a:endParaRPr lang="en-US"/>
           </a:p>
@@ -1842,7 +1842,7 @@
           <p:cNvPr id="8" name="Footer Placeholder 7">
             <a:extLst>
               <a:ext uri="{FF2B5EF4-FFF2-40B4-BE49-F238E27FC236}">
-                <a16:creationId xmlns="" xmlns:a16="http://schemas.microsoft.com/office/drawing/2014/main" id="{FE333A57-FFEE-412E-96B1-6F1A87CFE6F4}"/>
+                <a16:creationId xmlns:a16="http://schemas.microsoft.com/office/drawing/2014/main" xmlns="" id="{FE333A57-FFEE-412E-96B1-6F1A87CFE6F4}"/>
               </a:ext>
             </a:extLst>
           </p:cNvPr>
@@ -1867,7 +1867,7 @@
           <p:cNvPr id="9" name="Slide Number Placeholder 8">
             <a:extLst>
               <a:ext uri="{FF2B5EF4-FFF2-40B4-BE49-F238E27FC236}">
-                <a16:creationId xmlns="" xmlns:a16="http://schemas.microsoft.com/office/drawing/2014/main" id="{0D4B4C94-2DF4-481D-8EA4-BC3E7708E639}"/>
+                <a16:creationId xmlns:a16="http://schemas.microsoft.com/office/drawing/2014/main" xmlns="" id="{0D4B4C94-2DF4-481D-8EA4-BC3E7708E639}"/>
               </a:ext>
             </a:extLst>
           </p:cNvPr>
@@ -1926,7 +1926,7 @@
           <p:cNvPr id="2" name="Title 1">
             <a:extLst>
               <a:ext uri="{FF2B5EF4-FFF2-40B4-BE49-F238E27FC236}">
-                <a16:creationId xmlns="" xmlns:a16="http://schemas.microsoft.com/office/drawing/2014/main" id="{054ACC72-BE60-4AC8-AED9-D697627D5E9A}"/>
+                <a16:creationId xmlns:a16="http://schemas.microsoft.com/office/drawing/2014/main" xmlns="" id="{054ACC72-BE60-4AC8-AED9-D697627D5E9A}"/>
               </a:ext>
             </a:extLst>
           </p:cNvPr>
@@ -1954,7 +1954,7 @@
           <p:cNvPr id="3" name="Date Placeholder 2">
             <a:extLst>
               <a:ext uri="{FF2B5EF4-FFF2-40B4-BE49-F238E27FC236}">
-                <a16:creationId xmlns="" xmlns:a16="http://schemas.microsoft.com/office/drawing/2014/main" id="{737815A1-906B-4F66-A9B3-F1BF9C4A8CE8}"/>
+                <a16:creationId xmlns:a16="http://schemas.microsoft.com/office/drawing/2014/main" xmlns="" id="{737815A1-906B-4F66-A9B3-F1BF9C4A8CE8}"/>
               </a:ext>
             </a:extLst>
           </p:cNvPr>
@@ -1972,7 +1972,7 @@
           <a:p>
             <a:fld id="{451BDFE6-D27D-4DA7-953E-74377D1BCDB7}" type="datetimeFigureOut">
               <a:rPr lang="en-US" smtClean="0"/>
-              <a:t>8/4/17</a:t>
+              <a:t>8/13/17</a:t>
             </a:fld>
             <a:endParaRPr lang="en-US"/>
           </a:p>
@@ -1983,7 +1983,7 @@
           <p:cNvPr id="4" name="Footer Placeholder 3">
             <a:extLst>
               <a:ext uri="{FF2B5EF4-FFF2-40B4-BE49-F238E27FC236}">
-                <a16:creationId xmlns="" xmlns:a16="http://schemas.microsoft.com/office/drawing/2014/main" id="{52CC1920-2E05-43BD-8393-B40C139EA61D}"/>
+                <a16:creationId xmlns:a16="http://schemas.microsoft.com/office/drawing/2014/main" xmlns="" id="{52CC1920-2E05-43BD-8393-B40C139EA61D}"/>
               </a:ext>
             </a:extLst>
           </p:cNvPr>
@@ -2008,7 +2008,7 @@
           <p:cNvPr id="5" name="Slide Number Placeholder 4">
             <a:extLst>
               <a:ext uri="{FF2B5EF4-FFF2-40B4-BE49-F238E27FC236}">
-                <a16:creationId xmlns="" xmlns:a16="http://schemas.microsoft.com/office/drawing/2014/main" id="{716CB1B6-4B6D-4810-942D-ABDCFC302B2D}"/>
+                <a16:creationId xmlns:a16="http://schemas.microsoft.com/office/drawing/2014/main" xmlns="" id="{716CB1B6-4B6D-4810-942D-ABDCFC302B2D}"/>
               </a:ext>
             </a:extLst>
           </p:cNvPr>
@@ -2067,7 +2067,7 @@
           <p:cNvPr id="2" name="Date Placeholder 1">
             <a:extLst>
               <a:ext uri="{FF2B5EF4-FFF2-40B4-BE49-F238E27FC236}">
-                <a16:creationId xmlns="" xmlns:a16="http://schemas.microsoft.com/office/drawing/2014/main" id="{E44B6B29-4D1C-4667-807D-F14B8EBEC8C3}"/>
+                <a16:creationId xmlns:a16="http://schemas.microsoft.com/office/drawing/2014/main" xmlns="" id="{E44B6B29-4D1C-4667-807D-F14B8EBEC8C3}"/>
               </a:ext>
             </a:extLst>
           </p:cNvPr>
@@ -2085,7 +2085,7 @@
           <a:p>
             <a:fld id="{451BDFE6-D27D-4DA7-953E-74377D1BCDB7}" type="datetimeFigureOut">
               <a:rPr lang="en-US" smtClean="0"/>
-              <a:t>8/4/17</a:t>
+              <a:t>8/13/17</a:t>
             </a:fld>
             <a:endParaRPr lang="en-US"/>
           </a:p>
@@ -2096,7 +2096,7 @@
           <p:cNvPr id="3" name="Footer Placeholder 2">
             <a:extLst>
               <a:ext uri="{FF2B5EF4-FFF2-40B4-BE49-F238E27FC236}">
-                <a16:creationId xmlns="" xmlns:a16="http://schemas.microsoft.com/office/drawing/2014/main" id="{ED0C9340-C0E5-46AE-899A-00E9F8439C91}"/>
+                <a16:creationId xmlns:a16="http://schemas.microsoft.com/office/drawing/2014/main" xmlns="" id="{ED0C9340-C0E5-46AE-899A-00E9F8439C91}"/>
               </a:ext>
             </a:extLst>
           </p:cNvPr>
@@ -2121,7 +2121,7 @@
           <p:cNvPr id="4" name="Slide Number Placeholder 3">
             <a:extLst>
               <a:ext uri="{FF2B5EF4-FFF2-40B4-BE49-F238E27FC236}">
-                <a16:creationId xmlns="" xmlns:a16="http://schemas.microsoft.com/office/drawing/2014/main" id="{E5732DE3-0F86-48EB-BEE6-6E0B730CB031}"/>
+                <a16:creationId xmlns:a16="http://schemas.microsoft.com/office/drawing/2014/main" xmlns="" id="{E5732DE3-0F86-48EB-BEE6-6E0B730CB031}"/>
               </a:ext>
             </a:extLst>
           </p:cNvPr>
@@ -2180,7 +2180,7 @@
           <p:cNvPr id="2" name="Title 1">
             <a:extLst>
               <a:ext uri="{FF2B5EF4-FFF2-40B4-BE49-F238E27FC236}">
-                <a16:creationId xmlns="" xmlns:a16="http://schemas.microsoft.com/office/drawing/2014/main" id="{61AFEC77-2914-4BB9-84D7-F563C9B344E8}"/>
+                <a16:creationId xmlns:a16="http://schemas.microsoft.com/office/drawing/2014/main" xmlns="" id="{61AFEC77-2914-4BB9-84D7-F563C9B344E8}"/>
               </a:ext>
             </a:extLst>
           </p:cNvPr>
@@ -2217,7 +2217,7 @@
           <p:cNvPr id="3" name="Content Placeholder 2">
             <a:extLst>
               <a:ext uri="{FF2B5EF4-FFF2-40B4-BE49-F238E27FC236}">
-                <a16:creationId xmlns="" xmlns:a16="http://schemas.microsoft.com/office/drawing/2014/main" id="{6DB50B70-24F1-4F69-B803-55BBA8189300}"/>
+                <a16:creationId xmlns:a16="http://schemas.microsoft.com/office/drawing/2014/main" xmlns="" id="{6DB50B70-24F1-4F69-B803-55BBA8189300}"/>
               </a:ext>
             </a:extLst>
           </p:cNvPr>
@@ -2307,7 +2307,7 @@
           <p:cNvPr id="4" name="Text Placeholder 3">
             <a:extLst>
               <a:ext uri="{FF2B5EF4-FFF2-40B4-BE49-F238E27FC236}">
-                <a16:creationId xmlns="" xmlns:a16="http://schemas.microsoft.com/office/drawing/2014/main" id="{16D722E7-B608-486B-B7B7-8DB161EB53C3}"/>
+                <a16:creationId xmlns:a16="http://schemas.microsoft.com/office/drawing/2014/main" xmlns="" id="{16D722E7-B608-486B-B7B7-8DB161EB53C3}"/>
               </a:ext>
             </a:extLst>
           </p:cNvPr>
@@ -2378,7 +2378,7 @@
           <p:cNvPr id="5" name="Date Placeholder 4">
             <a:extLst>
               <a:ext uri="{FF2B5EF4-FFF2-40B4-BE49-F238E27FC236}">
-                <a16:creationId xmlns="" xmlns:a16="http://schemas.microsoft.com/office/drawing/2014/main" id="{24AB8A04-D83C-43CF-B315-49E502ACEBA9}"/>
+                <a16:creationId xmlns:a16="http://schemas.microsoft.com/office/drawing/2014/main" xmlns="" id="{24AB8A04-D83C-43CF-B315-49E502ACEBA9}"/>
               </a:ext>
             </a:extLst>
           </p:cNvPr>
@@ -2396,7 +2396,7 @@
           <a:p>
             <a:fld id="{451BDFE6-D27D-4DA7-953E-74377D1BCDB7}" type="datetimeFigureOut">
               <a:rPr lang="en-US" smtClean="0"/>
-              <a:t>8/4/17</a:t>
+              <a:t>8/13/17</a:t>
             </a:fld>
             <a:endParaRPr lang="en-US"/>
           </a:p>
@@ -2407,7 +2407,7 @@
           <p:cNvPr id="6" name="Footer Placeholder 5">
             <a:extLst>
               <a:ext uri="{FF2B5EF4-FFF2-40B4-BE49-F238E27FC236}">
-                <a16:creationId xmlns="" xmlns:a16="http://schemas.microsoft.com/office/drawing/2014/main" id="{B88710BE-9B1A-4D96-9FED-8E57CD596FF4}"/>
+                <a16:creationId xmlns:a16="http://schemas.microsoft.com/office/drawing/2014/main" xmlns="" id="{B88710BE-9B1A-4D96-9FED-8E57CD596FF4}"/>
               </a:ext>
             </a:extLst>
           </p:cNvPr>
@@ -2432,7 +2432,7 @@
           <p:cNvPr id="7" name="Slide Number Placeholder 6">
             <a:extLst>
               <a:ext uri="{FF2B5EF4-FFF2-40B4-BE49-F238E27FC236}">
-                <a16:creationId xmlns="" xmlns:a16="http://schemas.microsoft.com/office/drawing/2014/main" id="{60E2295E-4E22-4253-96B7-2033178792DE}"/>
+                <a16:creationId xmlns:a16="http://schemas.microsoft.com/office/drawing/2014/main" xmlns="" id="{60E2295E-4E22-4253-96B7-2033178792DE}"/>
               </a:ext>
             </a:extLst>
           </p:cNvPr>
@@ -2491,7 +2491,7 @@
           <p:cNvPr id="2" name="Title 1">
             <a:extLst>
               <a:ext uri="{FF2B5EF4-FFF2-40B4-BE49-F238E27FC236}">
-                <a16:creationId xmlns="" xmlns:a16="http://schemas.microsoft.com/office/drawing/2014/main" id="{840D861A-BFE2-4DEB-9604-3B41150B3941}"/>
+                <a16:creationId xmlns:a16="http://schemas.microsoft.com/office/drawing/2014/main" xmlns="" id="{840D861A-BFE2-4DEB-9604-3B41150B3941}"/>
               </a:ext>
             </a:extLst>
           </p:cNvPr>
@@ -2528,7 +2528,7 @@
           <p:cNvPr id="3" name="Picture Placeholder 2">
             <a:extLst>
               <a:ext uri="{FF2B5EF4-FFF2-40B4-BE49-F238E27FC236}">
-                <a16:creationId xmlns="" xmlns:a16="http://schemas.microsoft.com/office/drawing/2014/main" id="{E70776C9-E85E-4C0B-ABFC-7427CC4847D7}"/>
+                <a16:creationId xmlns:a16="http://schemas.microsoft.com/office/drawing/2014/main" xmlns="" id="{E70776C9-E85E-4C0B-ABFC-7427CC4847D7}"/>
               </a:ext>
             </a:extLst>
           </p:cNvPr>
@@ -2595,7 +2595,7 @@
           <p:cNvPr id="4" name="Text Placeholder 3">
             <a:extLst>
               <a:ext uri="{FF2B5EF4-FFF2-40B4-BE49-F238E27FC236}">
-                <a16:creationId xmlns="" xmlns:a16="http://schemas.microsoft.com/office/drawing/2014/main" id="{2A467B6E-00B6-4B68-8918-C2BEA2519D31}"/>
+                <a16:creationId xmlns:a16="http://schemas.microsoft.com/office/drawing/2014/main" xmlns="" id="{2A467B6E-00B6-4B68-8918-C2BEA2519D31}"/>
               </a:ext>
             </a:extLst>
           </p:cNvPr>
@@ -2666,7 +2666,7 @@
           <p:cNvPr id="5" name="Date Placeholder 4">
             <a:extLst>
               <a:ext uri="{FF2B5EF4-FFF2-40B4-BE49-F238E27FC236}">
-                <a16:creationId xmlns="" xmlns:a16="http://schemas.microsoft.com/office/drawing/2014/main" id="{42564AC2-B11C-46DC-89EE-E7D09C75D434}"/>
+                <a16:creationId xmlns:a16="http://schemas.microsoft.com/office/drawing/2014/main" xmlns="" id="{42564AC2-B11C-46DC-89EE-E7D09C75D434}"/>
               </a:ext>
             </a:extLst>
           </p:cNvPr>
@@ -2684,7 +2684,7 @@
           <a:p>
             <a:fld id="{451BDFE6-D27D-4DA7-953E-74377D1BCDB7}" type="datetimeFigureOut">
               <a:rPr lang="en-US" smtClean="0"/>
-              <a:t>8/4/17</a:t>
+              <a:t>8/13/17</a:t>
             </a:fld>
             <a:endParaRPr lang="en-US"/>
           </a:p>
@@ -2695,7 +2695,7 @@
           <p:cNvPr id="6" name="Footer Placeholder 5">
             <a:extLst>
               <a:ext uri="{FF2B5EF4-FFF2-40B4-BE49-F238E27FC236}">
-                <a16:creationId xmlns="" xmlns:a16="http://schemas.microsoft.com/office/drawing/2014/main" id="{2E57BAEE-8782-453E-A6D8-A6EFF77C6EEE}"/>
+                <a16:creationId xmlns:a16="http://schemas.microsoft.com/office/drawing/2014/main" xmlns="" id="{2E57BAEE-8782-453E-A6D8-A6EFF77C6EEE}"/>
               </a:ext>
             </a:extLst>
           </p:cNvPr>
@@ -2720,7 +2720,7 @@
           <p:cNvPr id="7" name="Slide Number Placeholder 6">
             <a:extLst>
               <a:ext uri="{FF2B5EF4-FFF2-40B4-BE49-F238E27FC236}">
-                <a16:creationId xmlns="" xmlns:a16="http://schemas.microsoft.com/office/drawing/2014/main" id="{8168AD34-DA13-4702-993D-350158129410}"/>
+                <a16:creationId xmlns:a16="http://schemas.microsoft.com/office/drawing/2014/main" xmlns="" id="{8168AD34-DA13-4702-993D-350158129410}"/>
               </a:ext>
             </a:extLst>
           </p:cNvPr>
@@ -2784,7 +2784,7 @@
           <p:cNvPr id="2" name="Title Placeholder 1">
             <a:extLst>
               <a:ext uri="{FF2B5EF4-FFF2-40B4-BE49-F238E27FC236}">
-                <a16:creationId xmlns="" xmlns:a16="http://schemas.microsoft.com/office/drawing/2014/main" id="{61F27013-F3FD-4B7F-B974-C054F1B2C67A}"/>
+                <a16:creationId xmlns:a16="http://schemas.microsoft.com/office/drawing/2014/main" xmlns="" id="{61F27013-F3FD-4B7F-B974-C054F1B2C67A}"/>
               </a:ext>
             </a:extLst>
           </p:cNvPr>
@@ -2822,7 +2822,7 @@
           <p:cNvPr id="3" name="Text Placeholder 2">
             <a:extLst>
               <a:ext uri="{FF2B5EF4-FFF2-40B4-BE49-F238E27FC236}">
-                <a16:creationId xmlns="" xmlns:a16="http://schemas.microsoft.com/office/drawing/2014/main" id="{B6AE2453-3670-4A3C-A6CF-03070062AEB1}"/>
+                <a16:creationId xmlns:a16="http://schemas.microsoft.com/office/drawing/2014/main" xmlns="" id="{B6AE2453-3670-4A3C-A6CF-03070062AEB1}"/>
               </a:ext>
             </a:extLst>
           </p:cNvPr>
@@ -2889,7 +2889,7 @@
           <p:cNvPr id="4" name="Date Placeholder 3">
             <a:extLst>
               <a:ext uri="{FF2B5EF4-FFF2-40B4-BE49-F238E27FC236}">
-                <a16:creationId xmlns="" xmlns:a16="http://schemas.microsoft.com/office/drawing/2014/main" id="{008FF460-549D-41FF-BC9F-A8635A4CE356}"/>
+                <a16:creationId xmlns:a16="http://schemas.microsoft.com/office/drawing/2014/main" xmlns="" id="{008FF460-549D-41FF-BC9F-A8635A4CE356}"/>
               </a:ext>
             </a:extLst>
           </p:cNvPr>
@@ -2925,7 +2925,7 @@
           <a:p>
             <a:fld id="{451BDFE6-D27D-4DA7-953E-74377D1BCDB7}" type="datetimeFigureOut">
               <a:rPr lang="en-US" smtClean="0"/>
-              <a:t>8/4/17</a:t>
+              <a:t>8/13/17</a:t>
             </a:fld>
             <a:endParaRPr lang="en-US"/>
           </a:p>
@@ -2936,7 +2936,7 @@
           <p:cNvPr id="5" name="Footer Placeholder 4">
             <a:extLst>
               <a:ext uri="{FF2B5EF4-FFF2-40B4-BE49-F238E27FC236}">
-                <a16:creationId xmlns="" xmlns:a16="http://schemas.microsoft.com/office/drawing/2014/main" id="{9D1AB9C2-031E-4792-B392-685FDF866D61}"/>
+                <a16:creationId xmlns:a16="http://schemas.microsoft.com/office/drawing/2014/main" xmlns="" id="{9D1AB9C2-031E-4792-B392-685FDF866D61}"/>
               </a:ext>
             </a:extLst>
           </p:cNvPr>
@@ -2979,7 +2979,7 @@
           <p:cNvPr id="6" name="Slide Number Placeholder 5">
             <a:extLst>
               <a:ext uri="{FF2B5EF4-FFF2-40B4-BE49-F238E27FC236}">
-                <a16:creationId xmlns="" xmlns:a16="http://schemas.microsoft.com/office/drawing/2014/main" id="{FDDD539C-2CA6-4C6F-AE2A-4F70D0E6FD14}"/>
+                <a16:creationId xmlns:a16="http://schemas.microsoft.com/office/drawing/2014/main" xmlns="" id="{FDDD539C-2CA6-4C6F-AE2A-4F70D0E6FD14}"/>
               </a:ext>
             </a:extLst>
           </p:cNvPr>
@@ -3347,7 +3347,7 @@
           <p:cNvPr id="2" name="Title 1">
             <a:extLst>
               <a:ext uri="{FF2B5EF4-FFF2-40B4-BE49-F238E27FC236}">
-                <a16:creationId xmlns="" xmlns:a16="http://schemas.microsoft.com/office/drawing/2014/main" id="{02EF250A-248E-4363-BE86-040330730565}"/>
+                <a16:creationId xmlns:a16="http://schemas.microsoft.com/office/drawing/2014/main" xmlns="" id="{02EF250A-248E-4363-BE86-040330730565}"/>
               </a:ext>
             </a:extLst>
           </p:cNvPr>
@@ -3375,8 +3375,8 @@
               <a:t>User’s Guide: </a:t>
             </a:r>
             <a:r>
-              <a:rPr lang="en-US" sz="4000" b="1" dirty="0" err="1"/>
-              <a:t>reference_proteome_manager_UniProt.py</a:t>
+              <a:rPr lang="en-US" sz="4000" b="1" dirty="0" err="1" smtClean="0"/>
+              <a:t>UniProt_reference_proteome_manager.py</a:t>
             </a:r>
             <a:r>
               <a:rPr lang="en-US" sz="4000" dirty="0"/>
@@ -3401,7 +3401,7 @@
           <p:cNvPr id="5" name="Picture 4">
             <a:extLst>
               <a:ext uri="{FF2B5EF4-FFF2-40B4-BE49-F238E27FC236}">
-                <a16:creationId xmlns="" xmlns:a16="http://schemas.microsoft.com/office/drawing/2014/main" id="{02A24FEA-A5B8-4AA7-9A1C-B4A60F59BEF6}"/>
+                <a16:creationId xmlns:a16="http://schemas.microsoft.com/office/drawing/2014/main" xmlns="" id="{02A24FEA-A5B8-4AA7-9A1C-B4A60F59BEF6}"/>
               </a:ext>
             </a:extLst>
           </p:cNvPr>
@@ -3474,7 +3474,7 @@
           <p:cNvPr id="2" name="Title 1">
             <a:extLst>
               <a:ext uri="{FF2B5EF4-FFF2-40B4-BE49-F238E27FC236}">
-                <a16:creationId xmlns="" xmlns:a16="http://schemas.microsoft.com/office/drawing/2014/main" id="{2075EE21-29F4-4890-B89B-0EC185D9F24C}"/>
+                <a16:creationId xmlns:a16="http://schemas.microsoft.com/office/drawing/2014/main" xmlns="" id="{2075EE21-29F4-4890-B89B-0EC185D9F24C}"/>
               </a:ext>
             </a:extLst>
           </p:cNvPr>
@@ -3503,7 +3503,7 @@
           <p:cNvPr id="7" name="Content Placeholder 6">
             <a:extLst>
               <a:ext uri="{FF2B5EF4-FFF2-40B4-BE49-F238E27FC236}">
-                <a16:creationId xmlns="" xmlns:a16="http://schemas.microsoft.com/office/drawing/2014/main" id="{5B1CDF20-C512-4DD1-AB5F-950585BA9ED7}"/>
+                <a16:creationId xmlns:a16="http://schemas.microsoft.com/office/drawing/2014/main" xmlns="" id="{5B1CDF20-C512-4DD1-AB5F-950585BA9ED7}"/>
               </a:ext>
             </a:extLst>
           </p:cNvPr>
@@ -3538,7 +3538,7 @@
           <p:cNvPr id="8" name="TextBox 7">
             <a:extLst>
               <a:ext uri="{FF2B5EF4-FFF2-40B4-BE49-F238E27FC236}">
-                <a16:creationId xmlns="" xmlns:a16="http://schemas.microsoft.com/office/drawing/2014/main" id="{0894BCC1-2F75-4534-8399-31AD4B6044D4}"/>
+                <a16:creationId xmlns:a16="http://schemas.microsoft.com/office/drawing/2014/main" xmlns="" id="{0894BCC1-2F75-4534-8399-31AD4B6044D4}"/>
               </a:ext>
             </a:extLst>
           </p:cNvPr>
@@ -3666,7 +3666,7 @@
           <p:cNvPr id="2" name="Title 1">
             <a:extLst>
               <a:ext uri="{FF2B5EF4-FFF2-40B4-BE49-F238E27FC236}">
-                <a16:creationId xmlns="" xmlns:a16="http://schemas.microsoft.com/office/drawing/2014/main" id="{584AFD2A-5F81-4445-9349-B8531B764232}"/>
+                <a16:creationId xmlns:a16="http://schemas.microsoft.com/office/drawing/2014/main" xmlns="" id="{584AFD2A-5F81-4445-9349-B8531B764232}"/>
               </a:ext>
             </a:extLst>
           </p:cNvPr>
@@ -3695,7 +3695,7 @@
           <p:cNvPr id="6" name="TextBox 5">
             <a:extLst>
               <a:ext uri="{FF2B5EF4-FFF2-40B4-BE49-F238E27FC236}">
-                <a16:creationId xmlns="" xmlns:a16="http://schemas.microsoft.com/office/drawing/2014/main" id="{65960FA9-2810-402A-BDE5-DE03E290CA4E}"/>
+                <a16:creationId xmlns:a16="http://schemas.microsoft.com/office/drawing/2014/main" xmlns="" id="{65960FA9-2810-402A-BDE5-DE03E290CA4E}"/>
               </a:ext>
             </a:extLst>
           </p:cNvPr>
@@ -3792,7 +3792,7 @@
           <p:cNvPr id="14" name="Content Placeholder 13">
             <a:extLst>
               <a:ext uri="{FF2B5EF4-FFF2-40B4-BE49-F238E27FC236}">
-                <a16:creationId xmlns="" xmlns:a16="http://schemas.microsoft.com/office/drawing/2014/main" id="{EAC578A9-F697-47E2-BB8A-8541315466E4}"/>
+                <a16:creationId xmlns:a16="http://schemas.microsoft.com/office/drawing/2014/main" xmlns="" id="{EAC578A9-F697-47E2-BB8A-8541315466E4}"/>
               </a:ext>
             </a:extLst>
           </p:cNvPr>
@@ -3857,7 +3857,7 @@
           <p:cNvPr id="2" name="Title 1">
             <a:extLst>
               <a:ext uri="{FF2B5EF4-FFF2-40B4-BE49-F238E27FC236}">
-                <a16:creationId xmlns="" xmlns:a16="http://schemas.microsoft.com/office/drawing/2014/main" id="{832CB0A4-DC24-4AB7-8883-0C3300AE67A9}"/>
+                <a16:creationId xmlns:a16="http://schemas.microsoft.com/office/drawing/2014/main" xmlns="" id="{832CB0A4-DC24-4AB7-8883-0C3300AE67A9}"/>
               </a:ext>
             </a:extLst>
           </p:cNvPr>
@@ -3870,7 +3870,7 @@
         </p:nvSpPr>
         <p:spPr>
           <a:xfrm>
-            <a:off x="838200" y="365125"/>
+            <a:off x="815897" y="153252"/>
             <a:ext cx="10515600" cy="1141703"/>
           </a:xfrm>
         </p:spPr>
@@ -3891,7 +3891,7 @@
           <p:cNvPr id="6" name="TextBox 5">
             <a:extLst>
               <a:ext uri="{FF2B5EF4-FFF2-40B4-BE49-F238E27FC236}">
-                <a16:creationId xmlns="" xmlns:a16="http://schemas.microsoft.com/office/drawing/2014/main" id="{E06F40A9-D33F-409B-AC77-A395DDF26DAB}"/>
+                <a16:creationId xmlns:a16="http://schemas.microsoft.com/office/drawing/2014/main" xmlns="" id="{E06F40A9-D33F-409B-AC77-A395DDF26DAB}"/>
               </a:ext>
             </a:extLst>
           </p:cNvPr>
@@ -3900,8 +3900,8 @@
         </p:nvSpPr>
         <p:spPr>
           <a:xfrm>
-            <a:off x="375449" y="1491079"/>
-            <a:ext cx="9416503" cy="5078313"/>
+            <a:off x="375449" y="1323814"/>
+            <a:ext cx="9416503" cy="5355312"/>
           </a:xfrm>
           <a:prstGeom prst="rect">
             <a:avLst/>
@@ -4116,7 +4116,15 @@
             </a:pPr>
             <a:r>
               <a:rPr lang="en-US" dirty="0"/>
-              <a:t>The naming convention for these files is “(proteome ID)_(taxonomy ID)_(species name)_</a:t>
+              <a:t>The naming convention for these files is </a:t>
+            </a:r>
+            <a:r>
+              <a:rPr lang="en-US" dirty="0" smtClean="0"/>
+              <a:t>“(version)_(proteome </a:t>
+            </a:r>
+            <a:r>
+              <a:rPr lang="en-US" dirty="0"/>
+              <a:t>ID)_(taxonomy ID)_(species name)_</a:t>
             </a:r>
             <a:r>
               <a:rPr lang="en-US" dirty="0" err="1"/>
@@ -4124,7 +4132,15 @@
             </a:r>
             <a:r>
               <a:rPr lang="en-US" dirty="0"/>
-              <a:t>” or “(proteome ID)_(taxonomy ID)_(species name)_</a:t>
+              <a:t>” or </a:t>
+            </a:r>
+            <a:r>
+              <a:rPr lang="en-US" dirty="0" smtClean="0"/>
+              <a:t>“(version)_(proteome </a:t>
+            </a:r>
+            <a:r>
+              <a:rPr lang="en-US" dirty="0"/>
+              <a:t>ID)_(taxonomy ID)_(species name)_</a:t>
             </a:r>
             <a:r>
               <a:rPr lang="en-US" dirty="0" err="1"/>
@@ -4188,7 +4204,7 @@
           <p:cNvPr id="8" name="Content Placeholder 7">
             <a:extLst>
               <a:ext uri="{FF2B5EF4-FFF2-40B4-BE49-F238E27FC236}">
-                <a16:creationId xmlns="" xmlns:a16="http://schemas.microsoft.com/office/drawing/2014/main" id="{526C8212-693E-4E3E-AFA7-CAD8E1598AD2}"/>
+                <a16:creationId xmlns:a16="http://schemas.microsoft.com/office/drawing/2014/main" xmlns="" id="{526C8212-693E-4E3E-AFA7-CAD8E1598AD2}"/>
               </a:ext>
             </a:extLst>
           </p:cNvPr>
@@ -4253,7 +4269,7 @@
           <p:cNvPr id="2" name="Title 1">
             <a:extLst>
               <a:ext uri="{FF2B5EF4-FFF2-40B4-BE49-F238E27FC236}">
-                <a16:creationId xmlns="" xmlns:a16="http://schemas.microsoft.com/office/drawing/2014/main" id="{FA12A580-0275-4480-8506-FEAE56FC2296}"/>
+                <a16:creationId xmlns:a16="http://schemas.microsoft.com/office/drawing/2014/main" xmlns="" id="{FA12A580-0275-4480-8506-FEAE56FC2296}"/>
               </a:ext>
             </a:extLst>
           </p:cNvPr>
@@ -4282,7 +4298,7 @@
           <p:cNvPr id="7" name="Content Placeholder 6">
             <a:extLst>
               <a:ext uri="{FF2B5EF4-FFF2-40B4-BE49-F238E27FC236}">
-                <a16:creationId xmlns="" xmlns:a16="http://schemas.microsoft.com/office/drawing/2014/main" id="{229C5CEC-BDD6-4C88-AED9-4F31E0845898}"/>
+                <a16:creationId xmlns:a16="http://schemas.microsoft.com/office/drawing/2014/main" xmlns="" id="{229C5CEC-BDD6-4C88-AED9-4F31E0845898}"/>
               </a:ext>
             </a:extLst>
           </p:cNvPr>
@@ -4317,7 +4333,7 @@
           <p:cNvPr id="8" name="TextBox 7">
             <a:extLst>
               <a:ext uri="{FF2B5EF4-FFF2-40B4-BE49-F238E27FC236}">
-                <a16:creationId xmlns="" xmlns:a16="http://schemas.microsoft.com/office/drawing/2014/main" id="{3F32F08F-6B0E-46F7-A5BC-143020E90F93}"/>
+                <a16:creationId xmlns:a16="http://schemas.microsoft.com/office/drawing/2014/main" xmlns="" id="{3F32F08F-6B0E-46F7-A5BC-143020E90F93}"/>
               </a:ext>
             </a:extLst>
           </p:cNvPr>
@@ -4400,7 +4416,7 @@
             </a:r>
             <a:r>
               <a:rPr lang="en-US" sz="4000" b="1" dirty="0" err="1" smtClean="0"/>
-              <a:t>reference_proteome_manager_UniProt</a:t>
+              <a:t>UniProt_reference_proteome_manager</a:t>
             </a:r>
             <a:r>
               <a:rPr lang="en-US" sz="4000" b="1" dirty="0" smtClean="0"/>
@@ -4965,11 +4981,15 @@
           <a:p>
             <a:r>
               <a:rPr lang="en-US" b="1" dirty="0" err="1" smtClean="0"/>
-              <a:t>reference_proteome_manager_UniProt</a:t>
+              <a:t>UniProt_reference_proteome_manager</a:t>
             </a:r>
             <a:r>
               <a:rPr lang="en-US" b="1" dirty="0" smtClean="0"/>
-              <a:t> helps</a:t>
+              <a:t> </a:t>
+            </a:r>
+            <a:r>
+              <a:rPr lang="en-US" b="1" dirty="0" smtClean="0"/>
+              <a:t>helps</a:t>
             </a:r>
             <a:endParaRPr lang="en-US" b="1" dirty="0"/>
           </a:p>
@@ -5064,18 +5084,24 @@
         </p:nvSpPr>
         <p:spPr/>
         <p:txBody>
-          <a:bodyPr/>
-          <a:lstStyle/>
-          <a:p>
-            <a:r>
-              <a:rPr lang="en-US" b="1" dirty="0" smtClean="0"/>
-              <a:t>How to run </a:t>
-            </a:r>
-            <a:r>
-              <a:rPr lang="en-US" b="1" dirty="0" err="1" smtClean="0"/>
-              <a:t>reference_proteome_manager</a:t>
-            </a:r>
-            <a:endParaRPr lang="en-US" b="1" dirty="0"/>
+          <a:bodyPr>
+            <a:normAutofit/>
+          </a:bodyPr>
+          <a:lstStyle/>
+          <a:p>
+            <a:r>
+              <a:rPr lang="en-US" sz="4000" b="1" dirty="0" smtClean="0"/>
+              <a:t>Running</a:t>
+            </a:r>
+            <a:r>
+              <a:rPr lang="en-US" sz="4000" b="1" dirty="0" smtClean="0"/>
+              <a:t> </a:t>
+            </a:r>
+            <a:r>
+              <a:rPr lang="en-US" sz="4000" b="1" dirty="0" err="1" smtClean="0"/>
+              <a:t>UniProt_reference_proteome_manager</a:t>
+            </a:r>
+            <a:endParaRPr lang="en-US" sz="4000" b="1" dirty="0"/>
           </a:p>
         </p:txBody>
       </p:sp>
@@ -5092,29 +5118,29 @@
         <p:spPr/>
         <p:txBody>
           <a:bodyPr>
-            <a:normAutofit lnSpcReduction="10000"/>
+            <a:normAutofit fontScale="92500" lnSpcReduction="10000"/>
           </a:bodyPr>
           <a:lstStyle/>
           <a:p>
             <a:r>
               <a:rPr lang="en-US" dirty="0" smtClean="0"/>
-              <a:t>A few</a:t>
-            </a:r>
-            <a:r>
-              <a:rPr lang="en-US" dirty="0" smtClean="0"/>
-              <a:t> </a:t>
-            </a:r>
-            <a:r>
-              <a:rPr lang="en-US" dirty="0" smtClean="0"/>
-              <a:t>files are needed: </a:t>
+              <a:t>A few files are needed: </a:t>
             </a:r>
             <a:r>
               <a:rPr lang="en-US" dirty="0" err="1" smtClean="0"/>
-              <a:t>reference_proteome_manager_UniProt.py</a:t>
-            </a:r>
-            <a:r>
-              <a:rPr lang="en-US" dirty="0" smtClean="0"/>
-              <a:t>, fasta_lib_Py3.py, </a:t>
+              <a:t>UniProt_reference_proteome_manager.py</a:t>
+            </a:r>
+            <a:r>
+              <a:rPr lang="en-US" dirty="0" smtClean="0"/>
+              <a:t>, </a:t>
+            </a:r>
+            <a:r>
+              <a:rPr lang="en-US" dirty="0" err="1" smtClean="0"/>
+              <a:t>fasta_lib.py</a:t>
+            </a:r>
+            <a:r>
+              <a:rPr lang="en-US" dirty="0" smtClean="0"/>
+              <a:t>, </a:t>
             </a:r>
             <a:r>
               <a:rPr lang="en-US" dirty="0" err="1" smtClean="0"/>
@@ -5122,25 +5148,24 @@
             </a:r>
             <a:r>
               <a:rPr lang="en-US" dirty="0" smtClean="0"/>
-              <a:t>, </a:t>
-            </a:r>
-            <a:r>
-              <a:rPr lang="en-US" smtClean="0"/>
-              <a:t>and a contaminants </a:t>
-            </a:r>
-            <a:r>
-              <a:rPr lang="en-US" dirty="0" smtClean="0"/>
-              <a:t>FASTA file (configured to use “</a:t>
+              <a:t>, and a contaminants FASTA file (configured to use </a:t>
+            </a:r>
+            <a:r>
+              <a:rPr lang="en-US" dirty="0" smtClean="0"/>
+              <a:t>“</a:t>
             </a:r>
             <a:r>
               <a:rPr lang="en-US" dirty="0" err="1" smtClean="0"/>
-              <a:t>all_contaminants_fixed.fasta</a:t>
+              <a:t>Thermo</a:t>
+            </a:r>
+            <a:r>
+              <a:rPr lang="en-US" dirty="0" err="1" smtClean="0"/>
+              <a:t>_contams_fixed.fasta</a:t>
             </a:r>
             <a:r>
               <a:rPr lang="en-US" dirty="0" smtClean="0"/>
               <a:t>”)</a:t>
             </a:r>
-            <a:endParaRPr lang="en-US" dirty="0" smtClean="0"/>
           </a:p>
           <a:p>
             <a:r>
@@ -5242,7 +5267,7 @@
           <p:cNvPr id="2" name="Title 1">
             <a:extLst>
               <a:ext uri="{FF2B5EF4-FFF2-40B4-BE49-F238E27FC236}">
-                <a16:creationId xmlns="" xmlns:a16="http://schemas.microsoft.com/office/drawing/2014/main" id="{0CB0C90F-4481-4C0C-8303-AF5538EDB207}"/>
+                <a16:creationId xmlns:a16="http://schemas.microsoft.com/office/drawing/2014/main" xmlns="" id="{0CB0C90F-4481-4C0C-8303-AF5538EDB207}"/>
               </a:ext>
             </a:extLst>
           </p:cNvPr>
@@ -5276,7 +5301,7 @@
           <p:cNvPr id="7" name="TextBox 6">
             <a:extLst>
               <a:ext uri="{FF2B5EF4-FFF2-40B4-BE49-F238E27FC236}">
-                <a16:creationId xmlns="" xmlns:a16="http://schemas.microsoft.com/office/drawing/2014/main" id="{AFAA1ECF-262C-492F-B424-70461622F911}"/>
+                <a16:creationId xmlns:a16="http://schemas.microsoft.com/office/drawing/2014/main" xmlns="" id="{AFAA1ECF-262C-492F-B424-70461622F911}"/>
               </a:ext>
             </a:extLst>
           </p:cNvPr>
@@ -5372,7 +5397,7 @@
           <p:cNvPr id="8" name="TextBox 7">
             <a:extLst>
               <a:ext uri="{FF2B5EF4-FFF2-40B4-BE49-F238E27FC236}">
-                <a16:creationId xmlns="" xmlns:a16="http://schemas.microsoft.com/office/drawing/2014/main" id="{17EA87E6-509E-43E1-AD10-F2E2F4E837A4}"/>
+                <a16:creationId xmlns:a16="http://schemas.microsoft.com/office/drawing/2014/main" xmlns="" id="{17EA87E6-509E-43E1-AD10-F2E2F4E837A4}"/>
               </a:ext>
             </a:extLst>
           </p:cNvPr>
@@ -5423,7 +5448,7 @@
           <p:cNvPr id="9" name="Content Placeholder 8">
             <a:extLst>
               <a:ext uri="{FF2B5EF4-FFF2-40B4-BE49-F238E27FC236}">
-                <a16:creationId xmlns="" xmlns:a16="http://schemas.microsoft.com/office/drawing/2014/main" id="{BA22EBB6-905F-4527-B64A-14B5FEA3C526}"/>
+                <a16:creationId xmlns:a16="http://schemas.microsoft.com/office/drawing/2014/main" xmlns="" id="{BA22EBB6-905F-4527-B64A-14B5FEA3C526}"/>
               </a:ext>
             </a:extLst>
           </p:cNvPr>
@@ -5488,7 +5513,7 @@
           <p:cNvPr id="2" name="Title 1">
             <a:extLst>
               <a:ext uri="{FF2B5EF4-FFF2-40B4-BE49-F238E27FC236}">
-                <a16:creationId xmlns="" xmlns:a16="http://schemas.microsoft.com/office/drawing/2014/main" id="{F532A41A-294E-456E-AF8A-EF505C3ED328}"/>
+                <a16:creationId xmlns:a16="http://schemas.microsoft.com/office/drawing/2014/main" xmlns="" id="{F532A41A-294E-456E-AF8A-EF505C3ED328}"/>
               </a:ext>
             </a:extLst>
           </p:cNvPr>
@@ -5518,7 +5543,7 @@
           <p:cNvPr id="6" name="TextBox 5">
             <a:extLst>
               <a:ext uri="{FF2B5EF4-FFF2-40B4-BE49-F238E27FC236}">
-                <a16:creationId xmlns="" xmlns:a16="http://schemas.microsoft.com/office/drawing/2014/main" id="{96719524-CA70-45DC-A8CA-6B093B27E318}"/>
+                <a16:creationId xmlns:a16="http://schemas.microsoft.com/office/drawing/2014/main" xmlns="" id="{96719524-CA70-45DC-A8CA-6B093B27E318}"/>
               </a:ext>
             </a:extLst>
           </p:cNvPr>
@@ -5692,7 +5717,7 @@
           <p:cNvPr id="8" name="Content Placeholder 7">
             <a:extLst>
               <a:ext uri="{FF2B5EF4-FFF2-40B4-BE49-F238E27FC236}">
-                <a16:creationId xmlns="" xmlns:a16="http://schemas.microsoft.com/office/drawing/2014/main" id="{308B288B-3489-4FD6-8FC1-87CD3D75423C}"/>
+                <a16:creationId xmlns:a16="http://schemas.microsoft.com/office/drawing/2014/main" xmlns="" id="{308B288B-3489-4FD6-8FC1-87CD3D75423C}"/>
               </a:ext>
             </a:extLst>
           </p:cNvPr>
@@ -5757,7 +5782,7 @@
           <p:cNvPr id="2" name="Title 1">
             <a:extLst>
               <a:ext uri="{FF2B5EF4-FFF2-40B4-BE49-F238E27FC236}">
-                <a16:creationId xmlns="" xmlns:a16="http://schemas.microsoft.com/office/drawing/2014/main" id="{1F0C4AC0-B4FC-4F18-9E24-4341BBF191C1}"/>
+                <a16:creationId xmlns:a16="http://schemas.microsoft.com/office/drawing/2014/main" xmlns="" id="{1F0C4AC0-B4FC-4F18-9E24-4341BBF191C1}"/>
               </a:ext>
             </a:extLst>
           </p:cNvPr>
@@ -5791,7 +5816,7 @@
           <p:cNvPr id="6" name="TextBox 5">
             <a:extLst>
               <a:ext uri="{FF2B5EF4-FFF2-40B4-BE49-F238E27FC236}">
-                <a16:creationId xmlns="" xmlns:a16="http://schemas.microsoft.com/office/drawing/2014/main" id="{F4D27808-9904-45BC-8BC8-C0D19D9AD3D4}"/>
+                <a16:creationId xmlns:a16="http://schemas.microsoft.com/office/drawing/2014/main" xmlns="" id="{F4D27808-9904-45BC-8BC8-C0D19D9AD3D4}"/>
               </a:ext>
             </a:extLst>
           </p:cNvPr>
@@ -5890,7 +5915,7 @@
           <p:cNvPr id="8" name="Content Placeholder 7">
             <a:extLst>
               <a:ext uri="{FF2B5EF4-FFF2-40B4-BE49-F238E27FC236}">
-                <a16:creationId xmlns="" xmlns:a16="http://schemas.microsoft.com/office/drawing/2014/main" id="{BB85C8BE-B143-409B-9E77-99AD3A900050}"/>
+                <a16:creationId xmlns:a16="http://schemas.microsoft.com/office/drawing/2014/main" xmlns="" id="{BB85C8BE-B143-409B-9E77-99AD3A900050}"/>
               </a:ext>
             </a:extLst>
           </p:cNvPr>

</xml_diff>